<commit_message>
Add skill aqua ring to water mage
</commit_message>
<xml_diff>
--- a/Developer_Note/Game_Key_Structure.pptx
+++ b/Developer_Note/Game_Key_Structure.pptx
@@ -104,6 +104,11 @@
       </a:defRPr>
     </a:lvl9pPr>
   </p:defaultTextStyle>
+  <p:extLst>
+    <p:ext uri="{EFAFB233-063F-42B5-8137-9DF3F51BA10A}">
+      <p15:sldGuideLst xmlns:p15="http://schemas.microsoft.com/office/powerpoint/2012/main"/>
+    </p:ext>
+  </p:extLst>
 </p:presentation>
 </file>
 
@@ -256,7 +261,7 @@
           <a:p>
             <a:fld id="{74840886-4A46-4055-8731-F60CFBCDDAD5}" type="datetimeFigureOut">
               <a:rPr lang="en-AU" smtClean="0"/>
-              <a:t>5/07/2025</a:t>
+              <a:t>6/07/2025</a:t>
             </a:fld>
             <a:endParaRPr lang="en-AU" dirty="0"/>
           </a:p>
@@ -456,7 +461,7 @@
           <a:p>
             <a:fld id="{74840886-4A46-4055-8731-F60CFBCDDAD5}" type="datetimeFigureOut">
               <a:rPr lang="en-AU" smtClean="0"/>
-              <a:t>5/07/2025</a:t>
+              <a:t>6/07/2025</a:t>
             </a:fld>
             <a:endParaRPr lang="en-AU" dirty="0"/>
           </a:p>
@@ -666,7 +671,7 @@
           <a:p>
             <a:fld id="{74840886-4A46-4055-8731-F60CFBCDDAD5}" type="datetimeFigureOut">
               <a:rPr lang="en-AU" smtClean="0"/>
-              <a:t>5/07/2025</a:t>
+              <a:t>6/07/2025</a:t>
             </a:fld>
             <a:endParaRPr lang="en-AU" dirty="0"/>
           </a:p>
@@ -866,7 +871,7 @@
           <a:p>
             <a:fld id="{74840886-4A46-4055-8731-F60CFBCDDAD5}" type="datetimeFigureOut">
               <a:rPr lang="en-AU" smtClean="0"/>
-              <a:t>5/07/2025</a:t>
+              <a:t>6/07/2025</a:t>
             </a:fld>
             <a:endParaRPr lang="en-AU" dirty="0"/>
           </a:p>
@@ -1142,7 +1147,7 @@
           <a:p>
             <a:fld id="{74840886-4A46-4055-8731-F60CFBCDDAD5}" type="datetimeFigureOut">
               <a:rPr lang="en-AU" smtClean="0"/>
-              <a:t>5/07/2025</a:t>
+              <a:t>6/07/2025</a:t>
             </a:fld>
             <a:endParaRPr lang="en-AU" dirty="0"/>
           </a:p>
@@ -1410,7 +1415,7 @@
           <a:p>
             <a:fld id="{74840886-4A46-4055-8731-F60CFBCDDAD5}" type="datetimeFigureOut">
               <a:rPr lang="en-AU" smtClean="0"/>
-              <a:t>5/07/2025</a:t>
+              <a:t>6/07/2025</a:t>
             </a:fld>
             <a:endParaRPr lang="en-AU" dirty="0"/>
           </a:p>
@@ -1825,7 +1830,7 @@
           <a:p>
             <a:fld id="{74840886-4A46-4055-8731-F60CFBCDDAD5}" type="datetimeFigureOut">
               <a:rPr lang="en-AU" smtClean="0"/>
-              <a:t>5/07/2025</a:t>
+              <a:t>6/07/2025</a:t>
             </a:fld>
             <a:endParaRPr lang="en-AU" dirty="0"/>
           </a:p>
@@ -1967,7 +1972,7 @@
           <a:p>
             <a:fld id="{74840886-4A46-4055-8731-F60CFBCDDAD5}" type="datetimeFigureOut">
               <a:rPr lang="en-AU" smtClean="0"/>
-              <a:t>5/07/2025</a:t>
+              <a:t>6/07/2025</a:t>
             </a:fld>
             <a:endParaRPr lang="en-AU" dirty="0"/>
           </a:p>
@@ -2080,7 +2085,7 @@
           <a:p>
             <a:fld id="{74840886-4A46-4055-8731-F60CFBCDDAD5}" type="datetimeFigureOut">
               <a:rPr lang="en-AU" smtClean="0"/>
-              <a:t>5/07/2025</a:t>
+              <a:t>6/07/2025</a:t>
             </a:fld>
             <a:endParaRPr lang="en-AU" dirty="0"/>
           </a:p>
@@ -2393,7 +2398,7 @@
           <a:p>
             <a:fld id="{74840886-4A46-4055-8731-F60CFBCDDAD5}" type="datetimeFigureOut">
               <a:rPr lang="en-AU" smtClean="0"/>
-              <a:t>5/07/2025</a:t>
+              <a:t>6/07/2025</a:t>
             </a:fld>
             <a:endParaRPr lang="en-AU" dirty="0"/>
           </a:p>
@@ -2682,7 +2687,7 @@
           <a:p>
             <a:fld id="{74840886-4A46-4055-8731-F60CFBCDDAD5}" type="datetimeFigureOut">
               <a:rPr lang="en-AU" smtClean="0"/>
-              <a:t>5/07/2025</a:t>
+              <a:t>6/07/2025</a:t>
             </a:fld>
             <a:endParaRPr lang="en-AU" dirty="0"/>
           </a:p>
@@ -2925,7 +2930,7 @@
           <a:p>
             <a:fld id="{74840886-4A46-4055-8731-F60CFBCDDAD5}" type="datetimeFigureOut">
               <a:rPr lang="en-AU" smtClean="0"/>
-              <a:t>5/07/2025</a:t>
+              <a:t>6/07/2025</a:t>
             </a:fld>
             <a:endParaRPr lang="en-AU" dirty="0"/>
           </a:p>
@@ -3356,7 +3361,7 @@
         </p:nvSpPr>
         <p:spPr>
           <a:xfrm>
-            <a:off x="3831336" y="2788920"/>
+            <a:off x="978408" y="2688336"/>
             <a:ext cx="1444752" cy="1655064"/>
           </a:xfrm>
           <a:prstGeom prst="rect">
@@ -3475,7 +3480,7 @@
         </p:nvSpPr>
         <p:spPr>
           <a:xfrm>
-            <a:off x="3831336" y="2395728"/>
+            <a:off x="978408" y="2295144"/>
             <a:ext cx="1444752" cy="393192"/>
           </a:xfrm>
           <a:prstGeom prst="rect">
@@ -3536,8 +3541,8 @@
         </p:nvSpPr>
         <p:spPr>
           <a:xfrm>
-            <a:off x="5830824" y="2788920"/>
-            <a:ext cx="1444752" cy="1655064"/>
+            <a:off x="2859024" y="2688336"/>
+            <a:ext cx="1539240" cy="1655064"/>
           </a:xfrm>
           <a:prstGeom prst="rect">
             <a:avLst/>
@@ -3574,6 +3579,38 @@
               </a:rPr>
               <a:t>Execute()</a:t>
             </a:r>
+            <a:r>
+              <a:rPr lang="en-US" sz="1000" dirty="0">
+                <a:solidFill>
+                  <a:schemeClr val="tx1"/>
+                </a:solidFill>
+                <a:sym typeface="Wingdings" panose="05000000000000000000" pitchFamily="2" charset="2"/>
+              </a:rPr>
+              <a:t></a:t>
+            </a:r>
+            <a:r>
+              <a:rPr lang="en-US" sz="1000" dirty="0" err="1">
+                <a:solidFill>
+                  <a:schemeClr val="tx1"/>
+                </a:solidFill>
+                <a:sym typeface="Wingdings" panose="05000000000000000000" pitchFamily="2" charset="2"/>
+              </a:rPr>
+              <a:t>skill_action</a:t>
+            </a:r>
+            <a:r>
+              <a:rPr lang="en-US" sz="1000" dirty="0">
+                <a:solidFill>
+                  <a:schemeClr val="tx1"/>
+                </a:solidFill>
+                <a:sym typeface="Wingdings" panose="05000000000000000000" pitchFamily="2" charset="2"/>
+              </a:rPr>
+              <a:t>()</a:t>
+            </a:r>
+            <a:endParaRPr lang="en-US" sz="1000" dirty="0">
+              <a:solidFill>
+                <a:schemeClr val="tx1"/>
+              </a:solidFill>
+            </a:endParaRPr>
           </a:p>
           <a:p>
             <a:r>
@@ -3692,8 +3729,8 @@
         </p:nvSpPr>
         <p:spPr>
           <a:xfrm>
-            <a:off x="5830824" y="2395728"/>
-            <a:ext cx="1444752" cy="393192"/>
+            <a:off x="2859024" y="2295144"/>
+            <a:ext cx="1539240" cy="393192"/>
           </a:xfrm>
           <a:prstGeom prst="rect">
             <a:avLst/>
@@ -3739,6 +3776,288 @@
           </a:p>
         </p:txBody>
       </p:sp>
+      <p:sp>
+        <p:nvSpPr>
+          <p:cNvPr id="2" name="Rectangle 1">
+            <a:extLst>
+              <a:ext uri="{FF2B5EF4-FFF2-40B4-BE49-F238E27FC236}">
+                <a16:creationId xmlns:a16="http://schemas.microsoft.com/office/drawing/2014/main" id="{D35DE410-AFC6-E66B-09A9-D5C6A3221AD6}"/>
+              </a:ext>
+            </a:extLst>
+          </p:cNvPr>
+          <p:cNvSpPr/>
+          <p:nvPr/>
+        </p:nvSpPr>
+        <p:spPr>
+          <a:xfrm>
+            <a:off x="4773168" y="2688336"/>
+            <a:ext cx="1837944" cy="1655064"/>
+          </a:xfrm>
+          <a:prstGeom prst="rect">
+            <a:avLst/>
+          </a:prstGeom>
+          <a:solidFill>
+            <a:schemeClr val="accent4"/>
+          </a:solidFill>
+        </p:spPr>
+        <p:style>
+          <a:lnRef idx="2">
+            <a:schemeClr val="accent1">
+              <a:shade val="15000"/>
+            </a:schemeClr>
+          </a:lnRef>
+          <a:fillRef idx="1">
+            <a:schemeClr val="accent1"/>
+          </a:fillRef>
+          <a:effectRef idx="0">
+            <a:schemeClr val="accent1"/>
+          </a:effectRef>
+          <a:fontRef idx="minor">
+            <a:schemeClr val="lt1"/>
+          </a:fontRef>
+        </p:style>
+        <p:txBody>
+          <a:bodyPr rtlCol="0" anchor="t"/>
+          <a:lstStyle/>
+          <a:p>
+            <a:r>
+              <a:rPr lang="en-US" sz="1000" dirty="0" err="1">
+                <a:solidFill>
+                  <a:schemeClr val="tx1"/>
+                </a:solidFill>
+              </a:rPr>
+              <a:t>ai_choose_skill</a:t>
+            </a:r>
+            <a:r>
+              <a:rPr lang="en-US" sz="1000" dirty="0">
+                <a:solidFill>
+                  <a:schemeClr val="tx1"/>
+                </a:solidFill>
+              </a:rPr>
+              <a:t>()</a:t>
+            </a:r>
+          </a:p>
+          <a:p>
+            <a:r>
+              <a:rPr lang="en-US" sz="1000" dirty="0" err="1">
+                <a:solidFill>
+                  <a:schemeClr val="tx1"/>
+                </a:solidFill>
+              </a:rPr>
+              <a:t>ai_choose_target</a:t>
+            </a:r>
+            <a:r>
+              <a:rPr lang="en-US" sz="1000" dirty="0">
+                <a:solidFill>
+                  <a:schemeClr val="tx1"/>
+                </a:solidFill>
+              </a:rPr>
+              <a:t>()</a:t>
+            </a:r>
+          </a:p>
+          <a:p>
+            <a:endParaRPr lang="en-AU" sz="1000" dirty="0">
+              <a:solidFill>
+                <a:schemeClr val="tx1"/>
+              </a:solidFill>
+            </a:endParaRPr>
+          </a:p>
+        </p:txBody>
+      </p:sp>
+      <p:sp>
+        <p:nvSpPr>
+          <p:cNvPr id="3" name="Rectangle 2">
+            <a:extLst>
+              <a:ext uri="{FF2B5EF4-FFF2-40B4-BE49-F238E27FC236}">
+                <a16:creationId xmlns:a16="http://schemas.microsoft.com/office/drawing/2014/main" id="{3C010E77-5A1F-F71F-7754-26BF27D1B989}"/>
+              </a:ext>
+            </a:extLst>
+          </p:cNvPr>
+          <p:cNvSpPr/>
+          <p:nvPr/>
+        </p:nvSpPr>
+        <p:spPr>
+          <a:xfrm>
+            <a:off x="4773168" y="2295144"/>
+            <a:ext cx="1837944" cy="393192"/>
+          </a:xfrm>
+          <a:prstGeom prst="rect">
+            <a:avLst/>
+          </a:prstGeom>
+          <a:solidFill>
+            <a:srgbClr val="FFFF00"/>
+          </a:solidFill>
+        </p:spPr>
+        <p:style>
+          <a:lnRef idx="2">
+            <a:schemeClr val="accent1">
+              <a:shade val="15000"/>
+            </a:schemeClr>
+          </a:lnRef>
+          <a:fillRef idx="1">
+            <a:schemeClr val="accent1"/>
+          </a:fillRef>
+          <a:effectRef idx="0">
+            <a:schemeClr val="accent1"/>
+          </a:effectRef>
+          <a:fontRef idx="minor">
+            <a:schemeClr val="lt1"/>
+          </a:fontRef>
+        </p:style>
+        <p:txBody>
+          <a:bodyPr rtlCol="0" anchor="ctr"/>
+          <a:lstStyle/>
+          <a:p>
+            <a:pPr algn="ctr"/>
+            <a:r>
+              <a:rPr lang="en-US" dirty="0">
+                <a:solidFill>
+                  <a:schemeClr val="tx1"/>
+                </a:solidFill>
+              </a:rPr>
+              <a:t>necromancer.py</a:t>
+            </a:r>
+            <a:endParaRPr lang="en-AU" dirty="0">
+              <a:solidFill>
+                <a:schemeClr val="tx1"/>
+              </a:solidFill>
+            </a:endParaRPr>
+          </a:p>
+        </p:txBody>
+      </p:sp>
+      <p:sp>
+        <p:nvSpPr>
+          <p:cNvPr id="8" name="Rectangle 7">
+            <a:extLst>
+              <a:ext uri="{FF2B5EF4-FFF2-40B4-BE49-F238E27FC236}">
+                <a16:creationId xmlns:a16="http://schemas.microsoft.com/office/drawing/2014/main" id="{3A2E1FDF-B91B-63AD-A152-BB591CD8C5D8}"/>
+              </a:ext>
+            </a:extLst>
+          </p:cNvPr>
+          <p:cNvSpPr/>
+          <p:nvPr/>
+        </p:nvSpPr>
+        <p:spPr>
+          <a:xfrm>
+            <a:off x="4837176" y="2729484"/>
+            <a:ext cx="1258824" cy="393192"/>
+          </a:xfrm>
+          <a:prstGeom prst="rect">
+            <a:avLst/>
+          </a:prstGeom>
+          <a:noFill/>
+          <a:ln>
+            <a:solidFill>
+              <a:srgbClr val="FF0000"/>
+            </a:solidFill>
+          </a:ln>
+        </p:spPr>
+        <p:style>
+          <a:lnRef idx="2">
+            <a:schemeClr val="accent1">
+              <a:shade val="15000"/>
+            </a:schemeClr>
+          </a:lnRef>
+          <a:fillRef idx="1">
+            <a:schemeClr val="accent1"/>
+          </a:fillRef>
+          <a:effectRef idx="0">
+            <a:schemeClr val="accent1"/>
+          </a:effectRef>
+          <a:fontRef idx="minor">
+            <a:schemeClr val="lt1"/>
+          </a:fontRef>
+        </p:style>
+        <p:txBody>
+          <a:bodyPr rtlCol="0" anchor="ctr"/>
+          <a:lstStyle/>
+          <a:p>
+            <a:pPr algn="ctr"/>
+            <a:endParaRPr lang="en-AU" dirty="0"/>
+          </a:p>
+        </p:txBody>
+      </p:sp>
+      <p:sp>
+        <p:nvSpPr>
+          <p:cNvPr id="9" name="TextBox 8">
+            <a:extLst>
+              <a:ext uri="{FF2B5EF4-FFF2-40B4-BE49-F238E27FC236}">
+                <a16:creationId xmlns:a16="http://schemas.microsoft.com/office/drawing/2014/main" id="{C14AC19A-338D-DED5-8664-1E626AD05193}"/>
+              </a:ext>
+            </a:extLst>
+          </p:cNvPr>
+          <p:cNvSpPr txBox="1"/>
+          <p:nvPr/>
+        </p:nvSpPr>
+        <p:spPr>
+          <a:xfrm>
+            <a:off x="5961888" y="1720572"/>
+            <a:ext cx="2925609" cy="369332"/>
+          </a:xfrm>
+          <a:prstGeom prst="rect">
+            <a:avLst/>
+          </a:prstGeom>
+          <a:noFill/>
+        </p:spPr>
+        <p:txBody>
+          <a:bodyPr wrap="none" rtlCol="0">
+            <a:spAutoFit/>
+          </a:bodyPr>
+          <a:lstStyle/>
+          <a:p>
+            <a:r>
+              <a:rPr lang="en-AU" dirty="0">
+                <a:solidFill>
+                  <a:srgbClr val="FF0000"/>
+                </a:solidFill>
+              </a:rPr>
+              <a:t>Override function in hero.py</a:t>
+            </a:r>
+          </a:p>
+        </p:txBody>
+      </p:sp>
+      <p:cxnSp>
+        <p:nvCxnSpPr>
+          <p:cNvPr id="11" name="Straight Arrow Connector 10">
+            <a:extLst>
+              <a:ext uri="{FF2B5EF4-FFF2-40B4-BE49-F238E27FC236}">
+                <a16:creationId xmlns:a16="http://schemas.microsoft.com/office/drawing/2014/main" id="{8033A9BD-822F-2724-D803-FACD9B16E592}"/>
+              </a:ext>
+            </a:extLst>
+          </p:cNvPr>
+          <p:cNvCxnSpPr>
+            <a:stCxn id="9" idx="2"/>
+            <a:endCxn id="8" idx="3"/>
+          </p:cNvCxnSpPr>
+          <p:nvPr/>
+        </p:nvCxnSpPr>
+        <p:spPr>
+          <a:xfrm flipH="1">
+            <a:off x="6096000" y="2089904"/>
+            <a:ext cx="1328693" cy="836176"/>
+          </a:xfrm>
+          <a:prstGeom prst="straightConnector1">
+            <a:avLst/>
+          </a:prstGeom>
+          <a:ln>
+            <a:tailEnd type="triangle"/>
+          </a:ln>
+        </p:spPr>
+        <p:style>
+          <a:lnRef idx="2">
+            <a:schemeClr val="accent1"/>
+          </a:lnRef>
+          <a:fillRef idx="0">
+            <a:schemeClr val="accent1"/>
+          </a:fillRef>
+          <a:effectRef idx="1">
+            <a:schemeClr val="accent1"/>
+          </a:effectRef>
+          <a:fontRef idx="minor">
+            <a:schemeClr val="tx1"/>
+          </a:fontRef>
+        </p:style>
+      </p:cxnSp>
     </p:spTree>
     <p:extLst>
       <p:ext uri="{BB962C8B-B14F-4D97-AF65-F5344CB8AC3E}">

</xml_diff>

<commit_message>
In Skill, resolve_targets() fix
</commit_message>
<xml_diff>
--- a/Developer_Note/Game_Key_Structure.pptx
+++ b/Developer_Note/Game_Key_Structure.pptx
@@ -6,6 +6,7 @@
   </p:sldMasterIdLst>
   <p:sldIdLst>
     <p:sldId id="256" r:id="rId2"/>
+    <p:sldId id="257" r:id="rId3"/>
   </p:sldIdLst>
   <p:sldSz cx="12192000" cy="6858000"/>
   <p:notesSz cx="6858000" cy="9144000"/>
@@ -261,7 +262,7 @@
           <a:p>
             <a:fld id="{74840886-4A46-4055-8731-F60CFBCDDAD5}" type="datetimeFigureOut">
               <a:rPr lang="en-AU" smtClean="0"/>
-              <a:t>6/07/2025</a:t>
+              <a:t>1/11/2025</a:t>
             </a:fld>
             <a:endParaRPr lang="en-AU" dirty="0"/>
           </a:p>
@@ -461,7 +462,7 @@
           <a:p>
             <a:fld id="{74840886-4A46-4055-8731-F60CFBCDDAD5}" type="datetimeFigureOut">
               <a:rPr lang="en-AU" smtClean="0"/>
-              <a:t>6/07/2025</a:t>
+              <a:t>1/11/2025</a:t>
             </a:fld>
             <a:endParaRPr lang="en-AU" dirty="0"/>
           </a:p>
@@ -671,7 +672,7 @@
           <a:p>
             <a:fld id="{74840886-4A46-4055-8731-F60CFBCDDAD5}" type="datetimeFigureOut">
               <a:rPr lang="en-AU" smtClean="0"/>
-              <a:t>6/07/2025</a:t>
+              <a:t>1/11/2025</a:t>
             </a:fld>
             <a:endParaRPr lang="en-AU" dirty="0"/>
           </a:p>
@@ -871,7 +872,7 @@
           <a:p>
             <a:fld id="{74840886-4A46-4055-8731-F60CFBCDDAD5}" type="datetimeFigureOut">
               <a:rPr lang="en-AU" smtClean="0"/>
-              <a:t>6/07/2025</a:t>
+              <a:t>1/11/2025</a:t>
             </a:fld>
             <a:endParaRPr lang="en-AU" dirty="0"/>
           </a:p>
@@ -1147,7 +1148,7 @@
           <a:p>
             <a:fld id="{74840886-4A46-4055-8731-F60CFBCDDAD5}" type="datetimeFigureOut">
               <a:rPr lang="en-AU" smtClean="0"/>
-              <a:t>6/07/2025</a:t>
+              <a:t>1/11/2025</a:t>
             </a:fld>
             <a:endParaRPr lang="en-AU" dirty="0"/>
           </a:p>
@@ -1415,7 +1416,7 @@
           <a:p>
             <a:fld id="{74840886-4A46-4055-8731-F60CFBCDDAD5}" type="datetimeFigureOut">
               <a:rPr lang="en-AU" smtClean="0"/>
-              <a:t>6/07/2025</a:t>
+              <a:t>1/11/2025</a:t>
             </a:fld>
             <a:endParaRPr lang="en-AU" dirty="0"/>
           </a:p>
@@ -1830,7 +1831,7 @@
           <a:p>
             <a:fld id="{74840886-4A46-4055-8731-F60CFBCDDAD5}" type="datetimeFigureOut">
               <a:rPr lang="en-AU" smtClean="0"/>
-              <a:t>6/07/2025</a:t>
+              <a:t>1/11/2025</a:t>
             </a:fld>
             <a:endParaRPr lang="en-AU" dirty="0"/>
           </a:p>
@@ -1972,7 +1973,7 @@
           <a:p>
             <a:fld id="{74840886-4A46-4055-8731-F60CFBCDDAD5}" type="datetimeFigureOut">
               <a:rPr lang="en-AU" smtClean="0"/>
-              <a:t>6/07/2025</a:t>
+              <a:t>1/11/2025</a:t>
             </a:fld>
             <a:endParaRPr lang="en-AU" dirty="0"/>
           </a:p>
@@ -2085,7 +2086,7 @@
           <a:p>
             <a:fld id="{74840886-4A46-4055-8731-F60CFBCDDAD5}" type="datetimeFigureOut">
               <a:rPr lang="en-AU" smtClean="0"/>
-              <a:t>6/07/2025</a:t>
+              <a:t>1/11/2025</a:t>
             </a:fld>
             <a:endParaRPr lang="en-AU" dirty="0"/>
           </a:p>
@@ -2398,7 +2399,7 @@
           <a:p>
             <a:fld id="{74840886-4A46-4055-8731-F60CFBCDDAD5}" type="datetimeFigureOut">
               <a:rPr lang="en-AU" smtClean="0"/>
-              <a:t>6/07/2025</a:t>
+              <a:t>1/11/2025</a:t>
             </a:fld>
             <a:endParaRPr lang="en-AU" dirty="0"/>
           </a:p>
@@ -2687,7 +2688,7 @@
           <a:p>
             <a:fld id="{74840886-4A46-4055-8731-F60CFBCDDAD5}" type="datetimeFigureOut">
               <a:rPr lang="en-AU" smtClean="0"/>
-              <a:t>6/07/2025</a:t>
+              <a:t>1/11/2025</a:t>
             </a:fld>
             <a:endParaRPr lang="en-AU" dirty="0"/>
           </a:p>
@@ -2930,7 +2931,7 @@
           <a:p>
             <a:fld id="{74840886-4A46-4055-8731-F60CFBCDDAD5}" type="datetimeFigureOut">
               <a:rPr lang="en-AU" smtClean="0"/>
-              <a:t>6/07/2025</a:t>
+              <a:t>1/11/2025</a:t>
             </a:fld>
             <a:endParaRPr lang="en-AU" dirty="0"/>
           </a:p>
@@ -4062,6 +4063,511 @@
     <p:extLst>
       <p:ext uri="{BB962C8B-B14F-4D97-AF65-F5344CB8AC3E}">
         <p14:creationId xmlns:p14="http://schemas.microsoft.com/office/powerpoint/2010/main" val="3732781381"/>
+      </p:ext>
+    </p:extLst>
+  </p:cSld>
+  <p:clrMapOvr>
+    <a:masterClrMapping/>
+  </p:clrMapOvr>
+</p:sld>
+</file>
+
+<file path=ppt/slides/slide2.xml><?xml version="1.0" encoding="utf-8"?>
+<p:sld xmlns:a="http://schemas.openxmlformats.org/drawingml/2006/main" xmlns:r="http://schemas.openxmlformats.org/officeDocument/2006/relationships" xmlns:p="http://schemas.openxmlformats.org/presentationml/2006/main">
+  <p:cSld>
+    <p:spTree>
+      <p:nvGrpSpPr>
+        <p:cNvPr id="1" name="">
+          <a:extLst>
+            <a:ext uri="{FF2B5EF4-FFF2-40B4-BE49-F238E27FC236}">
+              <a16:creationId xmlns:a16="http://schemas.microsoft.com/office/drawing/2014/main" id="{D3F14B0C-6EFA-383B-26E1-DBD7D2BE0A60}"/>
+            </a:ext>
+          </a:extLst>
+        </p:cNvPr>
+        <p:cNvGrpSpPr/>
+        <p:nvPr/>
+      </p:nvGrpSpPr>
+      <p:grpSpPr>
+        <a:xfrm>
+          <a:off x="0" y="0"/>
+          <a:ext cx="0" cy="0"/>
+          <a:chOff x="0" y="0"/>
+          <a:chExt cx="0" cy="0"/>
+        </a:xfrm>
+      </p:grpSpPr>
+      <p:sp>
+        <p:nvSpPr>
+          <p:cNvPr id="10" name="TextBox 9">
+            <a:extLst>
+              <a:ext uri="{FF2B5EF4-FFF2-40B4-BE49-F238E27FC236}">
+                <a16:creationId xmlns:a16="http://schemas.microsoft.com/office/drawing/2014/main" id="{FCC00700-1C39-CEE0-E007-5612E890BDD8}"/>
+              </a:ext>
+            </a:extLst>
+          </p:cNvPr>
+          <p:cNvSpPr txBox="1"/>
+          <p:nvPr/>
+        </p:nvSpPr>
+        <p:spPr>
+          <a:xfrm>
+            <a:off x="983226" y="629265"/>
+            <a:ext cx="2322367" cy="369332"/>
+          </a:xfrm>
+          <a:prstGeom prst="rect">
+            <a:avLst/>
+          </a:prstGeom>
+          <a:noFill/>
+        </p:spPr>
+        <p:txBody>
+          <a:bodyPr wrap="none" rtlCol="0">
+            <a:spAutoFit/>
+          </a:bodyPr>
+          <a:lstStyle/>
+          <a:p>
+            <a:r>
+              <a:rPr lang="en-US" dirty="0"/>
+              <a:t>Target Hit Judgement:</a:t>
+            </a:r>
+            <a:endParaRPr lang="en-AU" dirty="0"/>
+          </a:p>
+        </p:txBody>
+      </p:sp>
+      <p:sp>
+        <p:nvSpPr>
+          <p:cNvPr id="12" name="Rectangle 11">
+            <a:extLst>
+              <a:ext uri="{FF2B5EF4-FFF2-40B4-BE49-F238E27FC236}">
+                <a16:creationId xmlns:a16="http://schemas.microsoft.com/office/drawing/2014/main" id="{4FA1E609-4E10-C983-889E-DAE3C4EBBD80}"/>
+              </a:ext>
+            </a:extLst>
+          </p:cNvPr>
+          <p:cNvSpPr/>
+          <p:nvPr/>
+        </p:nvSpPr>
+        <p:spPr>
+          <a:xfrm>
+            <a:off x="845574" y="2595716"/>
+            <a:ext cx="1366684" cy="369332"/>
+          </a:xfrm>
+          <a:prstGeom prst="rect">
+            <a:avLst/>
+          </a:prstGeom>
+        </p:spPr>
+        <p:style>
+          <a:lnRef idx="2">
+            <a:schemeClr val="accent1">
+              <a:shade val="15000"/>
+            </a:schemeClr>
+          </a:lnRef>
+          <a:fillRef idx="1">
+            <a:schemeClr val="accent1"/>
+          </a:fillRef>
+          <a:effectRef idx="0">
+            <a:schemeClr val="accent1"/>
+          </a:effectRef>
+          <a:fontRef idx="minor">
+            <a:schemeClr val="lt1"/>
+          </a:fontRef>
+        </p:style>
+        <p:txBody>
+          <a:bodyPr rtlCol="0" anchor="ctr"/>
+          <a:lstStyle/>
+          <a:p>
+            <a:pPr algn="ctr"/>
+            <a:r>
+              <a:rPr lang="en-US" dirty="0"/>
+              <a:t>Dead</a:t>
+            </a:r>
+            <a:endParaRPr lang="en-AU" dirty="0"/>
+          </a:p>
+        </p:txBody>
+      </p:sp>
+      <p:sp>
+        <p:nvSpPr>
+          <p:cNvPr id="13" name="Rectangle 12">
+            <a:extLst>
+              <a:ext uri="{FF2B5EF4-FFF2-40B4-BE49-F238E27FC236}">
+                <a16:creationId xmlns:a16="http://schemas.microsoft.com/office/drawing/2014/main" id="{AA0A3F66-68D8-B2C1-C621-BF5D7F8588CE}"/>
+              </a:ext>
+            </a:extLst>
+          </p:cNvPr>
+          <p:cNvSpPr/>
+          <p:nvPr/>
+        </p:nvSpPr>
+        <p:spPr>
+          <a:xfrm>
+            <a:off x="845574" y="3137735"/>
+            <a:ext cx="1366684" cy="369332"/>
+          </a:xfrm>
+          <a:prstGeom prst="rect">
+            <a:avLst/>
+          </a:prstGeom>
+        </p:spPr>
+        <p:style>
+          <a:lnRef idx="2">
+            <a:schemeClr val="accent1">
+              <a:shade val="15000"/>
+            </a:schemeClr>
+          </a:lnRef>
+          <a:fillRef idx="1">
+            <a:schemeClr val="accent1"/>
+          </a:fillRef>
+          <a:effectRef idx="0">
+            <a:schemeClr val="accent1"/>
+          </a:effectRef>
+          <a:fontRef idx="minor">
+            <a:schemeClr val="lt1"/>
+          </a:fontRef>
+        </p:style>
+        <p:txBody>
+          <a:bodyPr rtlCol="0" anchor="ctr"/>
+          <a:lstStyle/>
+          <a:p>
+            <a:pPr algn="ctr"/>
+            <a:r>
+              <a:rPr lang="en-US" dirty="0"/>
+              <a:t>Evaded</a:t>
+            </a:r>
+            <a:endParaRPr lang="en-AU" dirty="0"/>
+          </a:p>
+        </p:txBody>
+      </p:sp>
+      <p:sp>
+        <p:nvSpPr>
+          <p:cNvPr id="14" name="TextBox 13">
+            <a:extLst>
+              <a:ext uri="{FF2B5EF4-FFF2-40B4-BE49-F238E27FC236}">
+                <a16:creationId xmlns:a16="http://schemas.microsoft.com/office/drawing/2014/main" id="{672266B8-DE99-DF82-C016-9B18CE51DF14}"/>
+              </a:ext>
+            </a:extLst>
+          </p:cNvPr>
+          <p:cNvSpPr txBox="1"/>
+          <p:nvPr/>
+        </p:nvSpPr>
+        <p:spPr>
+          <a:xfrm>
+            <a:off x="688258" y="1949385"/>
+            <a:ext cx="3420360" cy="646331"/>
+          </a:xfrm>
+          <a:prstGeom prst="rect">
+            <a:avLst/>
+          </a:prstGeom>
+          <a:noFill/>
+        </p:spPr>
+        <p:txBody>
+          <a:bodyPr wrap="none" rtlCol="0">
+            <a:spAutoFit/>
+          </a:bodyPr>
+          <a:lstStyle/>
+          <a:p>
+            <a:r>
+              <a:rPr lang="en-US" dirty="0"/>
+              <a:t>def </a:t>
+            </a:r>
+            <a:r>
+              <a:rPr lang="en-US" dirty="0" err="1"/>
+              <a:t>resolve_targets</a:t>
+            </a:r>
+            <a:r>
+              <a:rPr lang="en-US" dirty="0"/>
+              <a:t>(self, targets):</a:t>
+            </a:r>
+          </a:p>
+          <a:p>
+            <a:endParaRPr lang="en-AU" dirty="0"/>
+          </a:p>
+        </p:txBody>
+      </p:sp>
+      <p:sp>
+        <p:nvSpPr>
+          <p:cNvPr id="17" name="Rectangle 16">
+            <a:extLst>
+              <a:ext uri="{FF2B5EF4-FFF2-40B4-BE49-F238E27FC236}">
+                <a16:creationId xmlns:a16="http://schemas.microsoft.com/office/drawing/2014/main" id="{2F7838C7-5936-8C09-8E8A-D1AAE011D91F}"/>
+              </a:ext>
+            </a:extLst>
+          </p:cNvPr>
+          <p:cNvSpPr/>
+          <p:nvPr/>
+        </p:nvSpPr>
+        <p:spPr>
+          <a:xfrm>
+            <a:off x="850489" y="3708287"/>
+            <a:ext cx="2723537" cy="369332"/>
+          </a:xfrm>
+          <a:prstGeom prst="rect">
+            <a:avLst/>
+          </a:prstGeom>
+        </p:spPr>
+        <p:style>
+          <a:lnRef idx="2">
+            <a:schemeClr val="accent1">
+              <a:shade val="15000"/>
+            </a:schemeClr>
+          </a:lnRef>
+          <a:fillRef idx="1">
+            <a:schemeClr val="accent1"/>
+          </a:fillRef>
+          <a:effectRef idx="0">
+            <a:schemeClr val="accent1"/>
+          </a:effectRef>
+          <a:fontRef idx="minor">
+            <a:schemeClr val="lt1"/>
+          </a:fontRef>
+        </p:style>
+        <p:txBody>
+          <a:bodyPr rtlCol="0" anchor="t"/>
+          <a:lstStyle/>
+          <a:p>
+            <a:pPr algn="ctr"/>
+            <a:r>
+              <a:rPr lang="en-AU" dirty="0" err="1"/>
+              <a:t>immunity_condition_all</a:t>
+            </a:r>
+            <a:endParaRPr lang="en-AU" dirty="0"/>
+          </a:p>
+          <a:p>
+            <a:pPr algn="ctr"/>
+            <a:endParaRPr lang="en-AU" dirty="0"/>
+          </a:p>
+        </p:txBody>
+      </p:sp>
+      <p:sp>
+        <p:nvSpPr>
+          <p:cNvPr id="20" name="Rectangle 19">
+            <a:extLst>
+              <a:ext uri="{FF2B5EF4-FFF2-40B4-BE49-F238E27FC236}">
+                <a16:creationId xmlns:a16="http://schemas.microsoft.com/office/drawing/2014/main" id="{5D9BCB1D-CB86-ACB1-FA0E-A141A1E99424}"/>
+              </a:ext>
+            </a:extLst>
+          </p:cNvPr>
+          <p:cNvSpPr/>
+          <p:nvPr/>
+        </p:nvSpPr>
+        <p:spPr>
+          <a:xfrm>
+            <a:off x="845572" y="4241377"/>
+            <a:ext cx="3263046" cy="369332"/>
+          </a:xfrm>
+          <a:prstGeom prst="rect">
+            <a:avLst/>
+          </a:prstGeom>
+          <a:solidFill>
+            <a:schemeClr val="accent3"/>
+          </a:solidFill>
+        </p:spPr>
+        <p:style>
+          <a:lnRef idx="2">
+            <a:schemeClr val="accent1">
+              <a:shade val="15000"/>
+            </a:schemeClr>
+          </a:lnRef>
+          <a:fillRef idx="1">
+            <a:schemeClr val="accent1"/>
+          </a:fillRef>
+          <a:effectRef idx="0">
+            <a:schemeClr val="accent1"/>
+          </a:effectRef>
+          <a:fontRef idx="minor">
+            <a:schemeClr val="lt1"/>
+          </a:fontRef>
+        </p:style>
+        <p:txBody>
+          <a:bodyPr rtlCol="0" anchor="t"/>
+          <a:lstStyle/>
+          <a:p>
+            <a:pPr algn="ctr"/>
+            <a:r>
+              <a:rPr lang="en-AU" dirty="0" err="1"/>
+              <a:t>immunity_condition_physical</a:t>
+            </a:r>
+            <a:endParaRPr lang="en-AU" dirty="0"/>
+          </a:p>
+          <a:p>
+            <a:pPr algn="ctr"/>
+            <a:endParaRPr lang="en-AU" dirty="0"/>
+          </a:p>
+          <a:p>
+            <a:pPr algn="ctr"/>
+            <a:endParaRPr lang="en-AU" dirty="0"/>
+          </a:p>
+        </p:txBody>
+      </p:sp>
+      <p:sp>
+        <p:nvSpPr>
+          <p:cNvPr id="21" name="Rectangle 20">
+            <a:extLst>
+              <a:ext uri="{FF2B5EF4-FFF2-40B4-BE49-F238E27FC236}">
+                <a16:creationId xmlns:a16="http://schemas.microsoft.com/office/drawing/2014/main" id="{7674C1B2-585E-01F3-CC72-23E9546C57EF}"/>
+              </a:ext>
+            </a:extLst>
+          </p:cNvPr>
+          <p:cNvSpPr/>
+          <p:nvPr/>
+        </p:nvSpPr>
+        <p:spPr>
+          <a:xfrm>
+            <a:off x="845571" y="4814760"/>
+            <a:ext cx="3263046" cy="369332"/>
+          </a:xfrm>
+          <a:prstGeom prst="rect">
+            <a:avLst/>
+          </a:prstGeom>
+          <a:solidFill>
+            <a:schemeClr val="accent3"/>
+          </a:solidFill>
+        </p:spPr>
+        <p:style>
+          <a:lnRef idx="2">
+            <a:schemeClr val="accent1">
+              <a:shade val="15000"/>
+            </a:schemeClr>
+          </a:lnRef>
+          <a:fillRef idx="1">
+            <a:schemeClr val="accent1"/>
+          </a:fillRef>
+          <a:effectRef idx="0">
+            <a:schemeClr val="accent1"/>
+          </a:effectRef>
+          <a:fontRef idx="minor">
+            <a:schemeClr val="lt1"/>
+          </a:fontRef>
+        </p:style>
+        <p:txBody>
+          <a:bodyPr rtlCol="0" anchor="t"/>
+          <a:lstStyle/>
+          <a:p>
+            <a:pPr algn="ctr"/>
+            <a:r>
+              <a:rPr lang="en-AU" dirty="0" err="1"/>
+              <a:t>immunity_condition__magical</a:t>
+            </a:r>
+            <a:endParaRPr lang="en-AU" dirty="0"/>
+          </a:p>
+          <a:p>
+            <a:pPr algn="ctr"/>
+            <a:endParaRPr lang="en-AU" dirty="0"/>
+          </a:p>
+          <a:p>
+            <a:pPr algn="ctr"/>
+            <a:endParaRPr lang="en-AU" dirty="0"/>
+          </a:p>
+        </p:txBody>
+      </p:sp>
+      <p:sp>
+        <p:nvSpPr>
+          <p:cNvPr id="22" name="Rectangle 21">
+            <a:extLst>
+              <a:ext uri="{FF2B5EF4-FFF2-40B4-BE49-F238E27FC236}">
+                <a16:creationId xmlns:a16="http://schemas.microsoft.com/office/drawing/2014/main" id="{7C3029E1-19D3-F0C2-E959-5AFF6030CF04}"/>
+              </a:ext>
+            </a:extLst>
+          </p:cNvPr>
+          <p:cNvSpPr/>
+          <p:nvPr/>
+        </p:nvSpPr>
+        <p:spPr>
+          <a:xfrm>
+            <a:off x="845571" y="5388143"/>
+            <a:ext cx="3263046" cy="369332"/>
+          </a:xfrm>
+          <a:prstGeom prst="rect">
+            <a:avLst/>
+          </a:prstGeom>
+          <a:solidFill>
+            <a:schemeClr val="accent3"/>
+          </a:solidFill>
+        </p:spPr>
+        <p:style>
+          <a:lnRef idx="2">
+            <a:schemeClr val="accent1">
+              <a:shade val="15000"/>
+            </a:schemeClr>
+          </a:lnRef>
+          <a:fillRef idx="1">
+            <a:schemeClr val="accent1"/>
+          </a:fillRef>
+          <a:effectRef idx="0">
+            <a:schemeClr val="accent1"/>
+          </a:effectRef>
+          <a:fontRef idx="minor">
+            <a:schemeClr val="lt1"/>
+          </a:fontRef>
+        </p:style>
+        <p:txBody>
+          <a:bodyPr rtlCol="0" anchor="t"/>
+          <a:lstStyle/>
+          <a:p>
+            <a:pPr algn="ctr"/>
+            <a:r>
+              <a:rPr lang="en-AU" dirty="0" err="1"/>
+              <a:t>immunity_condition__control</a:t>
+            </a:r>
+            <a:endParaRPr lang="en-AU" dirty="0"/>
+          </a:p>
+          <a:p>
+            <a:pPr algn="ctr"/>
+            <a:endParaRPr lang="en-AU" dirty="0"/>
+          </a:p>
+          <a:p>
+            <a:pPr algn="ctr"/>
+            <a:endParaRPr lang="en-AU" dirty="0"/>
+          </a:p>
+        </p:txBody>
+      </p:sp>
+      <p:sp>
+        <p:nvSpPr>
+          <p:cNvPr id="24" name="Rectangle 23">
+            <a:extLst>
+              <a:ext uri="{FF2B5EF4-FFF2-40B4-BE49-F238E27FC236}">
+                <a16:creationId xmlns:a16="http://schemas.microsoft.com/office/drawing/2014/main" id="{804B0C89-E5F1-200B-1BE8-339DD1826D57}"/>
+              </a:ext>
+            </a:extLst>
+          </p:cNvPr>
+          <p:cNvSpPr/>
+          <p:nvPr/>
+        </p:nvSpPr>
+        <p:spPr>
+          <a:xfrm>
+            <a:off x="845574" y="5941740"/>
+            <a:ext cx="1366684" cy="369332"/>
+          </a:xfrm>
+          <a:prstGeom prst="rect">
+            <a:avLst/>
+          </a:prstGeom>
+        </p:spPr>
+        <p:style>
+          <a:lnRef idx="2">
+            <a:schemeClr val="accent1">
+              <a:shade val="15000"/>
+            </a:schemeClr>
+          </a:lnRef>
+          <a:fillRef idx="1">
+            <a:schemeClr val="accent1"/>
+          </a:fillRef>
+          <a:effectRef idx="0">
+            <a:schemeClr val="accent1"/>
+          </a:effectRef>
+          <a:fontRef idx="minor">
+            <a:schemeClr val="lt1"/>
+          </a:fontRef>
+        </p:style>
+        <p:txBody>
+          <a:bodyPr rtlCol="0" anchor="ctr"/>
+          <a:lstStyle/>
+          <a:p>
+            <a:pPr algn="ctr"/>
+            <a:r>
+              <a:rPr lang="en-US" dirty="0"/>
+              <a:t>Hit</a:t>
+            </a:r>
+            <a:endParaRPr lang="en-AU" dirty="0"/>
+          </a:p>
+        </p:txBody>
+      </p:sp>
+    </p:spTree>
+    <p:extLst>
+      <p:ext uri="{BB962C8B-B14F-4D97-AF65-F5344CB8AC3E}">
+        <p14:creationId xmlns:p14="http://schemas.microsoft.com/office/powerpoint/2010/main" val="501781812"/>
       </p:ext>
     </p:extLst>
   </p:cSld>

</xml_diff>